<commit_message>
Inserção de Fotos Apresentação Feira Academica 2013 Códigos exemplos de sonar e sensor de movimento
</commit_message>
<xml_diff>
--- a/Projetos/Emotiv/Documentos Finalizados/EMOTIV - Ação Global rev1.2.pptx
+++ b/Projetos/Emotiv/Documentos Finalizados/EMOTIV - Ação Global rev1.2.pptx
@@ -258,7 +258,7 @@
             <a:fld id="{0C2291EE-8BF2-48DB-9788-B91F8CC9A8AC}" type="datetimeFigureOut">
               <a:rPr lang="pt-BR" smtClean="0"/>
               <a:pPr/>
-              <a:t>03/11/2012</a:t>
+              <a:t>02/10/2013</a:t>
             </a:fld>
             <a:endParaRPr lang="pt-BR"/>
           </a:p>
@@ -573,7 +573,7 @@
             <a:fld id="{0C2291EE-8BF2-48DB-9788-B91F8CC9A8AC}" type="datetimeFigureOut">
               <a:rPr lang="pt-BR" smtClean="0"/>
               <a:pPr/>
-              <a:t>03/11/2012</a:t>
+              <a:t>02/10/2013</a:t>
             </a:fld>
             <a:endParaRPr lang="pt-BR"/>
           </a:p>
@@ -760,7 +760,7 @@
             <a:fld id="{0C2291EE-8BF2-48DB-9788-B91F8CC9A8AC}" type="datetimeFigureOut">
               <a:rPr lang="pt-BR" smtClean="0"/>
               <a:pPr/>
-              <a:t>03/11/2012</a:t>
+              <a:t>02/10/2013</a:t>
             </a:fld>
             <a:endParaRPr lang="pt-BR"/>
           </a:p>
@@ -937,7 +937,7 @@
             <a:fld id="{0C2291EE-8BF2-48DB-9788-B91F8CC9A8AC}" type="datetimeFigureOut">
               <a:rPr lang="pt-BR" smtClean="0"/>
               <a:pPr/>
-              <a:t>03/11/2012</a:t>
+              <a:t>02/10/2013</a:t>
             </a:fld>
             <a:endParaRPr lang="pt-BR"/>
           </a:p>
@@ -1207,7 +1207,7 @@
             <a:fld id="{0C2291EE-8BF2-48DB-9788-B91F8CC9A8AC}" type="datetimeFigureOut">
               <a:rPr lang="pt-BR" smtClean="0"/>
               <a:pPr/>
-              <a:t>03/11/2012</a:t>
+              <a:t>02/10/2013</a:t>
             </a:fld>
             <a:endParaRPr lang="pt-BR"/>
           </a:p>
@@ -1677,7 +1677,7 @@
             <a:fld id="{0C2291EE-8BF2-48DB-9788-B91F8CC9A8AC}" type="datetimeFigureOut">
               <a:rPr lang="pt-BR" smtClean="0"/>
               <a:pPr/>
-              <a:t>03/11/2012</a:t>
+              <a:t>02/10/2013</a:t>
             </a:fld>
             <a:endParaRPr lang="pt-BR"/>
           </a:p>
@@ -2168,7 +2168,7 @@
             <a:fld id="{0C2291EE-8BF2-48DB-9788-B91F8CC9A8AC}" type="datetimeFigureOut">
               <a:rPr lang="pt-BR" smtClean="0"/>
               <a:pPr/>
-              <a:t>03/11/2012</a:t>
+              <a:t>02/10/2013</a:t>
             </a:fld>
             <a:endParaRPr lang="pt-BR"/>
           </a:p>
@@ -2296,7 +2296,7 @@
             <a:fld id="{0C2291EE-8BF2-48DB-9788-B91F8CC9A8AC}" type="datetimeFigureOut">
               <a:rPr lang="pt-BR" smtClean="0"/>
               <a:pPr/>
-              <a:t>03/11/2012</a:t>
+              <a:t>02/10/2013</a:t>
             </a:fld>
             <a:endParaRPr lang="pt-BR"/>
           </a:p>
@@ -2442,7 +2442,7 @@
             <a:fld id="{0C2291EE-8BF2-48DB-9788-B91F8CC9A8AC}" type="datetimeFigureOut">
               <a:rPr lang="pt-BR" smtClean="0"/>
               <a:pPr/>
-              <a:t>03/11/2012</a:t>
+              <a:t>02/10/2013</a:t>
             </a:fld>
             <a:endParaRPr lang="pt-BR"/>
           </a:p>
@@ -2766,7 +2766,7 @@
             <a:fld id="{0C2291EE-8BF2-48DB-9788-B91F8CC9A8AC}" type="datetimeFigureOut">
               <a:rPr lang="pt-BR" smtClean="0"/>
               <a:pPr/>
-              <a:t>03/11/2012</a:t>
+              <a:t>02/10/2013</a:t>
             </a:fld>
             <a:endParaRPr lang="pt-BR"/>
           </a:p>
@@ -2902,7 +2902,7 @@
             <a:fld id="{0C2291EE-8BF2-48DB-9788-B91F8CC9A8AC}" type="datetimeFigureOut">
               <a:rPr lang="pt-BR" smtClean="0"/>
               <a:pPr/>
-              <a:t>03/11/2012</a:t>
+              <a:t>02/10/2013</a:t>
             </a:fld>
             <a:endParaRPr lang="pt-BR"/>
           </a:p>
@@ -3685,7 +3685,7 @@
             <a:fld id="{0C2291EE-8BF2-48DB-9788-B91F8CC9A8AC}" type="datetimeFigureOut">
               <a:rPr lang="pt-BR" smtClean="0"/>
               <a:pPr/>
-              <a:t>03/11/2012</a:t>
+              <a:t>02/10/2013</a:t>
             </a:fld>
             <a:endParaRPr lang="pt-BR"/>
           </a:p>
@@ -4310,66 +4310,28 @@
             <p:ph sz="half" idx="1"/>
           </p:nvPr>
         </p:nvSpPr>
-        <p:spPr/>
+        <p:spPr>
+          <a:xfrm>
+            <a:off x="1435608" y="1524000"/>
+            <a:ext cx="7351234" cy="4663440"/>
+          </a:xfrm>
+        </p:spPr>
         <p:txBody>
           <a:bodyPr/>
           <a:lstStyle/>
           <a:p>
             <a:r>
-              <a:rPr lang="pt-BR" dirty="0" smtClean="0">
-                <a:solidFill>
-                  <a:srgbClr val="FF0000"/>
-                </a:solidFill>
-              </a:rPr>
-              <a:t>Coloque aqui </a:t>
-            </a:r>
-            <a:r>
-              <a:rPr lang="pt-BR" dirty="0" err="1" smtClean="0">
-                <a:solidFill>
-                  <a:srgbClr val="FF0000"/>
-                </a:solidFill>
-              </a:rPr>
-              <a:t>infos</a:t>
-            </a:r>
-            <a:r>
-              <a:rPr lang="pt-BR" dirty="0" smtClean="0">
-                <a:solidFill>
-                  <a:srgbClr val="FF0000"/>
-                </a:solidFill>
-              </a:rPr>
-              <a:t> sobre o SDK que é o ambiente de desenvolvimento para criar aplicações (programas) para o </a:t>
-            </a:r>
-            <a:r>
-              <a:rPr lang="pt-BR" dirty="0" err="1" smtClean="0">
-                <a:solidFill>
-                  <a:srgbClr val="FF0000"/>
-                </a:solidFill>
-              </a:rPr>
-              <a:t>Emotiv</a:t>
-            </a:r>
-            <a:r>
-              <a:rPr lang="pt-BR" dirty="0" smtClean="0">
-                <a:solidFill>
-                  <a:srgbClr val="FF0000"/>
-                </a:solidFill>
-              </a:rPr>
-              <a:t>.</a:t>
-            </a:r>
-          </a:p>
-          <a:p>
-            <a:r>
-              <a:rPr lang="pt-BR" dirty="0" smtClean="0">
-                <a:solidFill>
-                  <a:srgbClr val="FF0000"/>
-                </a:solidFill>
-              </a:rPr>
-              <a:t>Se tiver dúvida me procure.</a:t>
-            </a:r>
-            <a:endParaRPr lang="pt-BR" dirty="0">
-              <a:solidFill>
-                <a:srgbClr val="FF0000"/>
-              </a:solidFill>
-            </a:endParaRPr>
+              <a:rPr lang="pt-BR" dirty="0" smtClean="0"/>
+              <a:t>SDK – Ferramenta de desenvolvimento</a:t>
+            </a:r>
+            <a:endParaRPr lang="pt-BR" dirty="0" smtClean="0"/>
+          </a:p>
+          <a:p>
+            <a:r>
+              <a:rPr lang="pt-BR" dirty="0" smtClean="0"/>
+              <a:t>API – Rotinas para programação</a:t>
+            </a:r>
+            <a:endParaRPr lang="pt-BR" dirty="0"/>
           </a:p>
         </p:txBody>
       </p:sp>
@@ -4388,7 +4350,7 @@
           <a:bodyPr/>
           <a:lstStyle/>
           <a:p>
-            <a:endParaRPr lang="pt-BR"/>
+            <a:endParaRPr lang="pt-BR" dirty="0"/>
           </a:p>
         </p:txBody>
       </p:sp>

</xml_diff>